<commit_message>
Updated data in file
</commit_message>
<xml_diff>
--- a/data/testPPT.pptx
+++ b/data/testPPT.pptx
@@ -290,7 +290,7 @@
             <a:fld id="{1D8BD707-D9CF-40AE-B4C6-C98DA3205C09}" type="datetimeFigureOut">
               <a:rPr lang="en-US" smtClean="0"/>
               <a:pPr/>
-              <a:t>3/6/2018</a:t>
+              <a:t>4/3/2018</a:t>
             </a:fld>
             <a:endParaRPr lang="en-US"/>
           </a:p>
@@ -457,7 +457,7 @@
             <a:fld id="{1D8BD707-D9CF-40AE-B4C6-C98DA3205C09}" type="datetimeFigureOut">
               <a:rPr lang="en-US" smtClean="0"/>
               <a:pPr/>
-              <a:t>3/6/2018</a:t>
+              <a:t>4/3/2018</a:t>
             </a:fld>
             <a:endParaRPr lang="en-US"/>
           </a:p>
@@ -634,7 +634,7 @@
             <a:fld id="{1D8BD707-D9CF-40AE-B4C6-C98DA3205C09}" type="datetimeFigureOut">
               <a:rPr lang="en-US" smtClean="0"/>
               <a:pPr/>
-              <a:t>3/6/2018</a:t>
+              <a:t>4/3/2018</a:t>
             </a:fld>
             <a:endParaRPr lang="en-US"/>
           </a:p>
@@ -801,7 +801,7 @@
             <a:fld id="{1D8BD707-D9CF-40AE-B4C6-C98DA3205C09}" type="datetimeFigureOut">
               <a:rPr lang="en-US" smtClean="0"/>
               <a:pPr/>
-              <a:t>3/6/2018</a:t>
+              <a:t>4/3/2018</a:t>
             </a:fld>
             <a:endParaRPr lang="en-US"/>
           </a:p>
@@ -1044,7 +1044,7 @@
             <a:fld id="{1D8BD707-D9CF-40AE-B4C6-C98DA3205C09}" type="datetimeFigureOut">
               <a:rPr lang="en-US" smtClean="0"/>
               <a:pPr/>
-              <a:t>3/6/2018</a:t>
+              <a:t>4/3/2018</a:t>
             </a:fld>
             <a:endParaRPr lang="en-US"/>
           </a:p>
@@ -1329,7 +1329,7 @@
             <a:fld id="{1D8BD707-D9CF-40AE-B4C6-C98DA3205C09}" type="datetimeFigureOut">
               <a:rPr lang="en-US" smtClean="0"/>
               <a:pPr/>
-              <a:t>3/6/2018</a:t>
+              <a:t>4/3/2018</a:t>
             </a:fld>
             <a:endParaRPr lang="en-US"/>
           </a:p>
@@ -1748,7 +1748,7 @@
             <a:fld id="{1D8BD707-D9CF-40AE-B4C6-C98DA3205C09}" type="datetimeFigureOut">
               <a:rPr lang="en-US" smtClean="0"/>
               <a:pPr/>
-              <a:t>3/6/2018</a:t>
+              <a:t>4/3/2018</a:t>
             </a:fld>
             <a:endParaRPr lang="en-US"/>
           </a:p>
@@ -1863,7 +1863,7 @@
             <a:fld id="{1D8BD707-D9CF-40AE-B4C6-C98DA3205C09}" type="datetimeFigureOut">
               <a:rPr lang="en-US" smtClean="0"/>
               <a:pPr/>
-              <a:t>3/6/2018</a:t>
+              <a:t>4/3/2018</a:t>
             </a:fld>
             <a:endParaRPr lang="en-US"/>
           </a:p>
@@ -1955,7 +1955,7 @@
             <a:fld id="{1D8BD707-D9CF-40AE-B4C6-C98DA3205C09}" type="datetimeFigureOut">
               <a:rPr lang="en-US" smtClean="0"/>
               <a:pPr/>
-              <a:t>3/6/2018</a:t>
+              <a:t>4/3/2018</a:t>
             </a:fld>
             <a:endParaRPr lang="en-US"/>
           </a:p>
@@ -2229,7 +2229,7 @@
             <a:fld id="{1D8BD707-D9CF-40AE-B4C6-C98DA3205C09}" type="datetimeFigureOut">
               <a:rPr lang="en-US" smtClean="0"/>
               <a:pPr/>
-              <a:t>3/6/2018</a:t>
+              <a:t>4/3/2018</a:t>
             </a:fld>
             <a:endParaRPr lang="en-US"/>
           </a:p>
@@ -2479,7 +2479,7 @@
             <a:fld id="{1D8BD707-D9CF-40AE-B4C6-C98DA3205C09}" type="datetimeFigureOut">
               <a:rPr lang="en-US" smtClean="0"/>
               <a:pPr/>
-              <a:t>3/6/2018</a:t>
+              <a:t>4/3/2018</a:t>
             </a:fld>
             <a:endParaRPr lang="en-US"/>
           </a:p>
@@ -2689,7 +2689,7 @@
             <a:fld id="{1D8BD707-D9CF-40AE-B4C6-C98DA3205C09}" type="datetimeFigureOut">
               <a:rPr lang="en-US" smtClean="0"/>
               <a:pPr/>
-              <a:t>3/6/2018</a:t>
+              <a:t>4/3/2018</a:t>
             </a:fld>
             <a:endParaRPr lang="en-US"/>
           </a:p>
@@ -3191,8 +3191,20 @@
               <a:t>restan</a:t>
             </a:r>
             <a:r>
-              <a:rPr lang="ro-RO" smtClean="0"/>
-              <a:t>ță?</a:t>
+              <a:rPr lang="ro-RO" dirty="0" smtClean="0"/>
+              <a:t>ță</a:t>
+            </a:r>
+            <a:r>
+              <a:rPr lang="ro-RO" dirty="0" smtClean="0"/>
+              <a:t>?</a:t>
+            </a:r>
+            <a:r>
+              <a:rPr lang="en-US" dirty="0" smtClean="0"/>
+              <a:t> </a:t>
+            </a:r>
+            <a:r>
+              <a:rPr lang="en-US" smtClean="0"/>
+              <a:t>Maimutele</a:t>
             </a:r>
             <a:endParaRPr lang="ro-RO" dirty="0"/>
           </a:p>

</xml_diff>